<commit_message>
Finished SemTech West 2011 Lightning Talk Slides
More work on revamping rdfConvert - threw out some of the old options that made it overly complex and began simplifying the code - not yet working
</commit_message>
<xml_diff>
--- a/Slides/SemTech West 2011 Lightning Talk.pptx
+++ b/Slides/SemTech West 2011 Lightning Talk.pptx
@@ -201,7 +201,7 @@
           <a:p>
             <a:fld id="{A4EFCF4D-B222-4BDE-9F21-361A6D2DD5DC}" type="datetimeFigureOut">
               <a:rPr lang="en-GB" smtClean="0"/>
-              <a:t>29/04/2011</a:t>
+              <a:t>05/05/2011</a:t>
             </a:fld>
             <a:endParaRPr lang="en-GB"/>
           </a:p>
@@ -467,6 +467,90 @@
     </a:lvl9pPr>
   </p:notesStyle>
 </p:notesMaster>
+</file>
+
+<file path=ppt/notesSlides/notesSlide1.xml><?xml version="1.0" encoding="utf-8"?>
+<p:notes xmlns:a="http://schemas.openxmlformats.org/drawingml/2006/main" xmlns:r="http://schemas.openxmlformats.org/officeDocument/2006/relationships" xmlns:p="http://schemas.openxmlformats.org/presentationml/2006/main">
+  <p:cSld>
+    <p:spTree>
+      <p:nvGrpSpPr>
+        <p:cNvPr id="1" name=""/>
+        <p:cNvGrpSpPr/>
+        <p:nvPr/>
+      </p:nvGrpSpPr>
+      <p:grpSpPr>
+        <a:xfrm>
+          <a:off x="0" y="0"/>
+          <a:ext cx="0" cy="0"/>
+          <a:chOff x="0" y="0"/>
+          <a:chExt cx="0" cy="0"/>
+        </a:xfrm>
+      </p:grpSpPr>
+      <p:sp>
+        <p:nvSpPr>
+          <p:cNvPr id="2" name="Slide Image Placeholder 1"/>
+          <p:cNvSpPr>
+            <a:spLocks noGrp="1" noRot="1" noChangeAspect="1"/>
+          </p:cNvSpPr>
+          <p:nvPr>
+            <p:ph type="sldImg"/>
+          </p:nvPr>
+        </p:nvSpPr>
+        <p:spPr/>
+      </p:sp>
+      <p:sp>
+        <p:nvSpPr>
+          <p:cNvPr id="3" name="Notes Placeholder 2"/>
+          <p:cNvSpPr>
+            <a:spLocks noGrp="1"/>
+          </p:cNvSpPr>
+          <p:nvPr>
+            <p:ph type="body" idx="1"/>
+          </p:nvPr>
+        </p:nvSpPr>
+        <p:spPr/>
+        <p:txBody>
+          <a:bodyPr/>
+          <a:lstStyle/>
+          <a:p>
+            <a:endParaRPr lang="en-GB"/>
+          </a:p>
+        </p:txBody>
+      </p:sp>
+      <p:sp>
+        <p:nvSpPr>
+          <p:cNvPr id="4" name="Slide Number Placeholder 3"/>
+          <p:cNvSpPr>
+            <a:spLocks noGrp="1"/>
+          </p:cNvSpPr>
+          <p:nvPr>
+            <p:ph type="sldNum" sz="quarter" idx="10"/>
+          </p:nvPr>
+        </p:nvSpPr>
+        <p:spPr/>
+        <p:txBody>
+          <a:bodyPr/>
+          <a:lstStyle/>
+          <a:p>
+            <a:fld id="{62BAB909-6E45-45BB-A68B-B7C0D89A88D2}" type="slidenum">
+              <a:rPr lang="en-GB" smtClean="0"/>
+              <a:t>9</a:t>
+            </a:fld>
+            <a:endParaRPr lang="en-GB"/>
+          </a:p>
+        </p:txBody>
+      </p:sp>
+    </p:spTree>
+    <p:extLst>
+      <p:ext uri="{BB962C8B-B14F-4D97-AF65-F5344CB8AC3E}">
+        <p14:creationId xmlns:p14="http://schemas.microsoft.com/office/powerpoint/2010/main" val="1822399441"/>
+      </p:ext>
+    </p:extLst>
+  </p:cSld>
+  <p:clrMapOvr>
+    <a:masterClrMapping/>
+  </p:clrMapOvr>
+</p:notes>
 </file>
 
 <file path=ppt/slideLayouts/slideLayout1.xml><?xml version="1.0" encoding="utf-8"?>
@@ -3393,10 +3477,15 @@
             <p:ph type="subTitle" idx="1"/>
           </p:nvPr>
         </p:nvSpPr>
-        <p:spPr/>
+        <p:spPr>
+          <a:xfrm>
+            <a:off x="863588" y="3356992"/>
+            <a:ext cx="7416824" cy="2160240"/>
+          </a:xfrm>
+        </p:spPr>
         <p:txBody>
           <a:bodyPr>
-            <a:normAutofit fontScale="92500"/>
+            <a:normAutofit fontScale="92500" lnSpcReduction="10000"/>
           </a:bodyPr>
           <a:lstStyle/>
           <a:p>
@@ -3426,9 +3515,37 @@
           <a:p>
             <a:r>
               <a:rPr lang="en-GB" dirty="0" smtClean="0"/>
-              <a:t>Via Website: http://www.dotnetrdf.org</a:t>
-            </a:r>
-            <a:endParaRPr lang="en-GB" dirty="0"/>
+              <a:t>Via Website: </a:t>
+            </a:r>
+            <a:r>
+              <a:rPr lang="en-GB" dirty="0" smtClean="0">
+                <a:hlinkClick r:id="rId3"/>
+              </a:rPr>
+              <a:t>http://</a:t>
+            </a:r>
+            <a:r>
+              <a:rPr lang="en-GB" dirty="0" smtClean="0">
+                <a:hlinkClick r:id="rId3"/>
+              </a:rPr>
+              <a:t>www.dotnetrdf.org</a:t>
+            </a:r>
+            <a:endParaRPr lang="en-GB" dirty="0" smtClean="0"/>
+          </a:p>
+          <a:p>
+            <a:r>
+              <a:rPr lang="en-GB" dirty="0" smtClean="0"/>
+              <a:t>Via Mailing List: </a:t>
+            </a:r>
+            <a:r>
+              <a:rPr lang="en-GB" dirty="0" smtClean="0">
+                <a:hlinkClick r:id="rId4"/>
+              </a:rPr>
+              <a:t>dotnetrdf-support@lists.sf.net</a:t>
+            </a:r>
+            <a:endParaRPr lang="en-GB" dirty="0" smtClean="0"/>
+          </a:p>
+          <a:p>
+            <a:endParaRPr lang="en-GB" dirty="0" smtClean="0"/>
           </a:p>
         </p:txBody>
       </p:sp>
@@ -3582,8 +3699,16 @@
               <a:t>Wanted to be able to code PhD Research projects using </a:t>
             </a:r>
             <a:r>
+              <a:rPr lang="en-GB" dirty="0" smtClean="0"/>
+              <a:t>a </a:t>
+            </a:r>
+            <a:r>
               <a:rPr lang="en-GB" dirty="0" err="1" smtClean="0"/>
               <a:t>.Net</a:t>
+            </a:r>
+            <a:r>
+              <a:rPr lang="en-GB" dirty="0" smtClean="0"/>
+              <a:t> technology stack</a:t>
             </a:r>
             <a:endParaRPr lang="en-GB" dirty="0" smtClean="0"/>
           </a:p>
@@ -3831,7 +3956,11 @@
             </a:r>
             <a:r>
               <a:rPr lang="en-GB" dirty="0" smtClean="0"/>
-              <a:t>and Windows Phone 7 (latter two are cut down)</a:t>
+              <a:t>and Windows Phone 7 (latter two are cut </a:t>
+            </a:r>
+            <a:r>
+              <a:rPr lang="en-GB" dirty="0" smtClean="0"/>
+              <a:t>down and community contributed)</a:t>
             </a:r>
             <a:endParaRPr lang="en-GB" dirty="0"/>
           </a:p>
@@ -3979,7 +4108,9 @@
         </p:nvSpPr>
         <p:spPr/>
         <p:txBody>
-          <a:bodyPr/>
+          <a:bodyPr>
+            <a:normAutofit lnSpcReduction="10000"/>
+          </a:bodyPr>
           <a:lstStyle/>
           <a:p>
             <a:r>
@@ -4025,7 +4156,15 @@
             <a:pPr lvl="1"/>
             <a:r>
               <a:rPr lang="en-GB" dirty="0" smtClean="0"/>
-              <a:t>LINQ to Objects, Properties, Indexers etc.</a:t>
+              <a:t>LINQ to Objects, Properties, </a:t>
+            </a:r>
+            <a:r>
+              <a:rPr lang="en-GB" dirty="0" smtClean="0"/>
+              <a:t>Indexers, Extension Methods </a:t>
+            </a:r>
+            <a:r>
+              <a:rPr lang="en-GB" dirty="0" smtClean="0"/>
+              <a:t>etc.</a:t>
             </a:r>
             <a:endParaRPr lang="en-GB" dirty="0"/>
           </a:p>
@@ -4840,18 +4979,29 @@
         </p:nvSpPr>
         <p:spPr/>
         <p:txBody>
-          <a:bodyPr/>
-          <a:lstStyle/>
-          <a:p>
-            <a:r>
-              <a:rPr lang="en-GB" dirty="0" smtClean="0"/>
-              <a:t>Many applications rely on fast and efficient SPARQL processing</a:t>
-            </a:r>
-          </a:p>
-          <a:p>
-            <a:r>
-              <a:rPr lang="en-GB" dirty="0" smtClean="0"/>
-              <a:t>Leviathan supports both Query and Update including powerful features like:</a:t>
+          <a:bodyPr>
+            <a:normAutofit lnSpcReduction="10000"/>
+          </a:bodyPr>
+          <a:lstStyle/>
+          <a:p>
+            <a:r>
+              <a:rPr lang="en-GB" dirty="0" smtClean="0"/>
+              <a:t>Capable of performing SPARQL queries in-memory on small amounts of data (&lt;=1m Triples)</a:t>
+            </a:r>
+            <a:endParaRPr lang="en-GB" dirty="0" smtClean="0"/>
+          </a:p>
+          <a:p>
+            <a:r>
+              <a:rPr lang="en-GB" dirty="0"/>
+              <a:t>S</a:t>
+            </a:r>
+            <a:r>
+              <a:rPr lang="en-GB" dirty="0" smtClean="0"/>
+              <a:t>upports </a:t>
+            </a:r>
+            <a:r>
+              <a:rPr lang="en-GB" dirty="0" smtClean="0"/>
+              <a:t>both Query and Update including powerful features like:</a:t>
             </a:r>
           </a:p>
           <a:p>
@@ -5028,12 +5178,26 @@
         </p:nvSpPr>
         <p:spPr/>
         <p:txBody>
-          <a:bodyPr/>
-          <a:lstStyle/>
-          <a:p>
-            <a:r>
-              <a:rPr lang="en-GB" dirty="0" smtClean="0"/>
-              <a:t>Supports a range of common 3</a:t>
+          <a:bodyPr>
+            <a:normAutofit lnSpcReduction="10000"/>
+          </a:bodyPr>
+          <a:lstStyle/>
+          <a:p>
+            <a:r>
+              <a:rPr lang="en-GB" dirty="0" smtClean="0"/>
+              <a:t>Supports a range of </a:t>
+            </a:r>
+            <a:r>
+              <a:rPr lang="en-GB" dirty="0" smtClean="0"/>
+              <a:t>well known</a:t>
+            </a:r>
+            <a:r>
+              <a:rPr lang="en-GB" dirty="0" smtClean="0"/>
+              <a:t> </a:t>
+            </a:r>
+            <a:r>
+              <a:rPr lang="en-GB" dirty="0" smtClean="0"/>
+              <a:t>3</a:t>
             </a:r>
             <a:r>
               <a:rPr lang="en-GB" baseline="30000" dirty="0" smtClean="0"/>
@@ -5084,8 +5248,20 @@
             </a:r>
             <a:r>
               <a:rPr lang="en-GB" dirty="0" smtClean="0"/>
-              <a:t> and Virtuoso</a:t>
-            </a:r>
+              <a:t> and </a:t>
+            </a:r>
+            <a:r>
+              <a:rPr lang="en-GB" dirty="0" smtClean="0"/>
+              <a:t>Virtuoso</a:t>
+            </a:r>
+          </a:p>
+          <a:p>
+            <a:pPr lvl="1"/>
+            <a:r>
+              <a:rPr lang="en-GB" dirty="0" smtClean="0"/>
+              <a:t>Plus generic SPARQL store support</a:t>
+            </a:r>
+            <a:endParaRPr lang="en-GB" dirty="0" smtClean="0"/>
           </a:p>
           <a:p>
             <a:r>
@@ -5273,7 +5449,19 @@
           <a:p>
             <a:r>
               <a:rPr lang="en-GB" dirty="0" smtClean="0"/>
-              <a:t>Designed to make it possible to get you started experimenting with RDF and SPARQL without having to code</a:t>
+              <a:t>Designed to make it possible to get you started experimenting with RDF and </a:t>
+            </a:r>
+            <a:r>
+              <a:rPr lang="en-GB" dirty="0" smtClean="0"/>
+              <a:t>SPARQL on Windows </a:t>
+            </a:r>
+            <a:r>
+              <a:rPr lang="en-GB" dirty="0" smtClean="0"/>
+              <a:t>without having to </a:t>
+            </a:r>
+            <a:r>
+              <a:rPr lang="en-GB" dirty="0" smtClean="0"/>
+              <a:t>code yourself</a:t>
             </a:r>
             <a:endParaRPr lang="en-GB" dirty="0"/>
           </a:p>
@@ -5403,7 +5591,11 @@
           <a:p>
             <a:r>
               <a:rPr lang="en-GB" dirty="0" smtClean="0"/>
-              <a:t>Coming Soon</a:t>
+              <a:t>Coming </a:t>
+            </a:r>
+            <a:r>
+              <a:rPr lang="en-GB" dirty="0" smtClean="0"/>
+              <a:t>Soon</a:t>
             </a:r>
             <a:endParaRPr lang="en-GB" dirty="0"/>
           </a:p>
@@ -5508,8 +5700,33 @@
           <a:p>
             <a:r>
               <a:rPr lang="en-GB" dirty="0" smtClean="0"/>
-              <a:t>OWL Support</a:t>
-            </a:r>
+              <a:t>OWL </a:t>
+            </a:r>
+            <a:r>
+              <a:rPr lang="en-GB" dirty="0" smtClean="0"/>
+              <a:t>Support</a:t>
+            </a:r>
+          </a:p>
+          <a:p>
+            <a:r>
+              <a:rPr lang="en-GB" dirty="0" smtClean="0"/>
+              <a:t>SPARQL Extensions</a:t>
+            </a:r>
+          </a:p>
+          <a:p>
+            <a:pPr lvl="1"/>
+            <a:r>
+              <a:rPr lang="en-GB" dirty="0" smtClean="0"/>
+              <a:t>Full Text search</a:t>
+            </a:r>
+          </a:p>
+          <a:p>
+            <a:pPr lvl="1"/>
+            <a:r>
+              <a:rPr lang="en-GB" dirty="0" err="1" smtClean="0"/>
+              <a:t>GeoSPARQL</a:t>
+            </a:r>
+            <a:endParaRPr lang="en-GB" dirty="0" smtClean="0"/>
           </a:p>
         </p:txBody>
       </p:sp>

</xml_diff>

<commit_message>
Added notes to SemTech West 2011 slides
</commit_message>
<xml_diff>
--- a/Slides/SemTech West 2011 Lightning Talk.pptx
+++ b/Slides/SemTech West 2011 Lightning Talk.pptx
@@ -201,7 +201,8 @@
           <a:p>
             <a:fld id="{A4EFCF4D-B222-4BDE-9F21-361A6D2DD5DC}" type="datetimeFigureOut">
               <a:rPr lang="en-GB" smtClean="0"/>
-              <a:t>05/05/2011</a:t>
+              <a:pPr/>
+              <a:t>31/05/2011</a:t>
             </a:fld>
             <a:endParaRPr lang="en-GB"/>
           </a:p>
@@ -360,6 +361,7 @@
           <a:p>
             <a:fld id="{62BAB909-6E45-45BB-A68B-B7C0D89A88D2}" type="slidenum">
               <a:rPr lang="en-GB" smtClean="0"/>
+              <a:pPr/>
               <a:t>‹#›</a:t>
             </a:fld>
             <a:endParaRPr lang="en-GB"/>
@@ -369,7 +371,7 @@
     </p:spTree>
     <p:extLst>
       <p:ext uri="{BB962C8B-B14F-4D97-AF65-F5344CB8AC3E}">
-        <p14:creationId xmlns:p14="http://schemas.microsoft.com/office/powerpoint/2010/main" val="3764111685"/>
+        <p14:creationId xmlns:p14="http://schemas.microsoft.com/office/powerpoint/2010/main" xmlns="" val="3764111685"/>
       </p:ext>
     </p:extLst>
   </p:cSld>
@@ -510,10 +512,33 @@
         </p:nvSpPr>
         <p:spPr/>
         <p:txBody>
-          <a:bodyPr/>
-          <a:lstStyle/>
-          <a:p>
-            <a:endParaRPr lang="en-GB"/>
+          <a:bodyPr>
+            <a:normAutofit/>
+          </a:bodyPr>
+          <a:lstStyle/>
+          <a:p>
+            <a:r>
+              <a:rPr lang="en-GB" dirty="0" smtClean="0"/>
+              <a:t>Introduce</a:t>
+            </a:r>
+            <a:r>
+              <a:rPr lang="en-GB" baseline="0" dirty="0" smtClean="0"/>
+              <a:t> myself and affiliation</a:t>
+            </a:r>
+          </a:p>
+          <a:p>
+            <a:r>
+              <a:rPr lang="en-GB" baseline="0" dirty="0" smtClean="0"/>
+              <a:t>Note that I intend to go through the slides </a:t>
+            </a:r>
+            <a:r>
+              <a:rPr lang="en-GB" baseline="0" smtClean="0"/>
+              <a:t>reasonably fast</a:t>
+            </a:r>
+            <a:endParaRPr lang="en-GB" baseline="0" dirty="0" smtClean="0"/>
+          </a:p>
+          <a:p>
+            <a:endParaRPr lang="en-GB" dirty="0"/>
           </a:p>
         </p:txBody>
       </p:sp>
@@ -534,6 +559,976 @@
           <a:p>
             <a:fld id="{62BAB909-6E45-45BB-A68B-B7C0D89A88D2}" type="slidenum">
               <a:rPr lang="en-GB" smtClean="0"/>
+              <a:pPr/>
+              <a:t>1</a:t>
+            </a:fld>
+            <a:endParaRPr lang="en-GB"/>
+          </a:p>
+        </p:txBody>
+      </p:sp>
+    </p:spTree>
+  </p:cSld>
+  <p:clrMapOvr>
+    <a:masterClrMapping/>
+  </p:clrMapOvr>
+</p:notes>
+</file>
+
+<file path=ppt/notesSlides/notesSlide10.xml><?xml version="1.0" encoding="utf-8"?>
+<p:notes xmlns:a="http://schemas.openxmlformats.org/drawingml/2006/main" xmlns:r="http://schemas.openxmlformats.org/officeDocument/2006/relationships" xmlns:p="http://schemas.openxmlformats.org/presentationml/2006/main">
+  <p:cSld>
+    <p:spTree>
+      <p:nvGrpSpPr>
+        <p:cNvPr id="1" name=""/>
+        <p:cNvGrpSpPr/>
+        <p:nvPr/>
+      </p:nvGrpSpPr>
+      <p:grpSpPr>
+        <a:xfrm>
+          <a:off x="0" y="0"/>
+          <a:ext cx="0" cy="0"/>
+          <a:chOff x="0" y="0"/>
+          <a:chExt cx="0" cy="0"/>
+        </a:xfrm>
+      </p:grpSpPr>
+      <p:sp>
+        <p:nvSpPr>
+          <p:cNvPr id="2" name="Slide Image Placeholder 1"/>
+          <p:cNvSpPr>
+            <a:spLocks noGrp="1" noRot="1" noChangeAspect="1"/>
+          </p:cNvSpPr>
+          <p:nvPr>
+            <p:ph type="sldImg"/>
+          </p:nvPr>
+        </p:nvSpPr>
+        <p:spPr/>
+      </p:sp>
+      <p:sp>
+        <p:nvSpPr>
+          <p:cNvPr id="3" name="Notes Placeholder 2"/>
+          <p:cNvSpPr>
+            <a:spLocks noGrp="1"/>
+          </p:cNvSpPr>
+          <p:nvPr>
+            <p:ph type="body" idx="1"/>
+          </p:nvPr>
+        </p:nvSpPr>
+        <p:spPr/>
+        <p:txBody>
+          <a:bodyPr>
+            <a:normAutofit/>
+          </a:bodyPr>
+          <a:lstStyle/>
+          <a:p>
+            <a:r>
+              <a:rPr lang="en-GB" dirty="0" smtClean="0"/>
+              <a:t>Questions if time</a:t>
+            </a:r>
+            <a:endParaRPr lang="en-GB" dirty="0"/>
+          </a:p>
+        </p:txBody>
+      </p:sp>
+      <p:sp>
+        <p:nvSpPr>
+          <p:cNvPr id="4" name="Slide Number Placeholder 3"/>
+          <p:cNvSpPr>
+            <a:spLocks noGrp="1"/>
+          </p:cNvSpPr>
+          <p:nvPr>
+            <p:ph type="sldNum" sz="quarter" idx="10"/>
+          </p:nvPr>
+        </p:nvSpPr>
+        <p:spPr/>
+        <p:txBody>
+          <a:bodyPr/>
+          <a:lstStyle/>
+          <a:p>
+            <a:fld id="{62BAB909-6E45-45BB-A68B-B7C0D89A88D2}" type="slidenum">
+              <a:rPr lang="en-GB" smtClean="0"/>
+              <a:pPr/>
+              <a:t>10</a:t>
+            </a:fld>
+            <a:endParaRPr lang="en-GB"/>
+          </a:p>
+        </p:txBody>
+      </p:sp>
+    </p:spTree>
+  </p:cSld>
+  <p:clrMapOvr>
+    <a:masterClrMapping/>
+  </p:clrMapOvr>
+</p:notes>
+</file>
+
+<file path=ppt/notesSlides/notesSlide2.xml><?xml version="1.0" encoding="utf-8"?>
+<p:notes xmlns:a="http://schemas.openxmlformats.org/drawingml/2006/main" xmlns:r="http://schemas.openxmlformats.org/officeDocument/2006/relationships" xmlns:p="http://schemas.openxmlformats.org/presentationml/2006/main">
+  <p:cSld>
+    <p:spTree>
+      <p:nvGrpSpPr>
+        <p:cNvPr id="1" name=""/>
+        <p:cNvGrpSpPr/>
+        <p:nvPr/>
+      </p:nvGrpSpPr>
+      <p:grpSpPr>
+        <a:xfrm>
+          <a:off x="0" y="0"/>
+          <a:ext cx="0" cy="0"/>
+          <a:chOff x="0" y="0"/>
+          <a:chExt cx="0" cy="0"/>
+        </a:xfrm>
+      </p:grpSpPr>
+      <p:sp>
+        <p:nvSpPr>
+          <p:cNvPr id="2" name="Slide Image Placeholder 1"/>
+          <p:cNvSpPr>
+            <a:spLocks noGrp="1" noRot="1" noChangeAspect="1"/>
+          </p:cNvSpPr>
+          <p:nvPr>
+            <p:ph type="sldImg"/>
+          </p:nvPr>
+        </p:nvSpPr>
+        <p:spPr/>
+      </p:sp>
+      <p:sp>
+        <p:nvSpPr>
+          <p:cNvPr id="3" name="Notes Placeholder 2"/>
+          <p:cNvSpPr>
+            <a:spLocks noGrp="1"/>
+          </p:cNvSpPr>
+          <p:nvPr>
+            <p:ph type="body" idx="1"/>
+          </p:nvPr>
+        </p:nvSpPr>
+        <p:spPr/>
+        <p:txBody>
+          <a:bodyPr>
+            <a:normAutofit/>
+          </a:bodyPr>
+          <a:lstStyle/>
+          <a:p>
+            <a:r>
+              <a:rPr lang="en-GB" dirty="0" smtClean="0"/>
+              <a:t>Lack of existing technology</a:t>
+            </a:r>
+            <a:r>
+              <a:rPr lang="en-GB" baseline="0" dirty="0" smtClean="0"/>
+              <a:t> in the </a:t>
+            </a:r>
+            <a:r>
+              <a:rPr lang="en-GB" baseline="0" dirty="0" err="1" smtClean="0"/>
+              <a:t>.Net</a:t>
+            </a:r>
+            <a:r>
+              <a:rPr lang="en-GB" baseline="0" dirty="0" smtClean="0"/>
+              <a:t> space that did what I wanted</a:t>
+            </a:r>
+          </a:p>
+          <a:p>
+            <a:r>
+              <a:rPr lang="en-GB" baseline="0" dirty="0" smtClean="0"/>
+              <a:t>In particular 3</a:t>
+            </a:r>
+            <a:r>
+              <a:rPr lang="en-GB" baseline="30000" dirty="0" smtClean="0"/>
+              <a:t>rd</a:t>
+            </a:r>
+            <a:r>
+              <a:rPr lang="en-GB" baseline="0" dirty="0" smtClean="0"/>
+              <a:t> party triple store and SPARQL 1.1 support</a:t>
+            </a:r>
+          </a:p>
+          <a:p>
+            <a:r>
+              <a:rPr lang="en-GB" baseline="0" dirty="0" smtClean="0"/>
+              <a:t>Wanted library to feel </a:t>
+            </a:r>
+            <a:r>
+              <a:rPr lang="en-GB" baseline="0" dirty="0" err="1" smtClean="0"/>
+              <a:t>.Net</a:t>
+            </a:r>
+            <a:r>
+              <a:rPr lang="en-GB" baseline="0" dirty="0" smtClean="0"/>
+              <a:t> and use latest features</a:t>
+            </a:r>
+            <a:endParaRPr lang="en-GB" dirty="0"/>
+          </a:p>
+        </p:txBody>
+      </p:sp>
+      <p:sp>
+        <p:nvSpPr>
+          <p:cNvPr id="4" name="Slide Number Placeholder 3"/>
+          <p:cNvSpPr>
+            <a:spLocks noGrp="1"/>
+          </p:cNvSpPr>
+          <p:nvPr>
+            <p:ph type="sldNum" sz="quarter" idx="10"/>
+          </p:nvPr>
+        </p:nvSpPr>
+        <p:spPr/>
+        <p:txBody>
+          <a:bodyPr/>
+          <a:lstStyle/>
+          <a:p>
+            <a:fld id="{62BAB909-6E45-45BB-A68B-B7C0D89A88D2}" type="slidenum">
+              <a:rPr lang="en-GB" smtClean="0"/>
+              <a:pPr/>
+              <a:t>2</a:t>
+            </a:fld>
+            <a:endParaRPr lang="en-GB"/>
+          </a:p>
+        </p:txBody>
+      </p:sp>
+    </p:spTree>
+  </p:cSld>
+  <p:clrMapOvr>
+    <a:masterClrMapping/>
+  </p:clrMapOvr>
+</p:notes>
+</file>
+
+<file path=ppt/notesSlides/notesSlide3.xml><?xml version="1.0" encoding="utf-8"?>
+<p:notes xmlns:a="http://schemas.openxmlformats.org/drawingml/2006/main" xmlns:r="http://schemas.openxmlformats.org/officeDocument/2006/relationships" xmlns:p="http://schemas.openxmlformats.org/presentationml/2006/main">
+  <p:cSld>
+    <p:spTree>
+      <p:nvGrpSpPr>
+        <p:cNvPr id="1" name=""/>
+        <p:cNvGrpSpPr/>
+        <p:nvPr/>
+      </p:nvGrpSpPr>
+      <p:grpSpPr>
+        <a:xfrm>
+          <a:off x="0" y="0"/>
+          <a:ext cx="0" cy="0"/>
+          <a:chOff x="0" y="0"/>
+          <a:chExt cx="0" cy="0"/>
+        </a:xfrm>
+      </p:grpSpPr>
+      <p:sp>
+        <p:nvSpPr>
+          <p:cNvPr id="2" name="Slide Image Placeholder 1"/>
+          <p:cNvSpPr>
+            <a:spLocks noGrp="1" noRot="1" noChangeAspect="1"/>
+          </p:cNvSpPr>
+          <p:nvPr>
+            <p:ph type="sldImg"/>
+          </p:nvPr>
+        </p:nvSpPr>
+        <p:spPr/>
+      </p:sp>
+      <p:sp>
+        <p:nvSpPr>
+          <p:cNvPr id="3" name="Notes Placeholder 2"/>
+          <p:cNvSpPr>
+            <a:spLocks noGrp="1"/>
+          </p:cNvSpPr>
+          <p:nvPr>
+            <p:ph type="body" idx="1"/>
+          </p:nvPr>
+        </p:nvSpPr>
+        <p:spPr/>
+        <p:txBody>
+          <a:bodyPr>
+            <a:normAutofit/>
+          </a:bodyPr>
+          <a:lstStyle/>
+          <a:p>
+            <a:r>
+              <a:rPr lang="en-GB" dirty="0" smtClean="0"/>
+              <a:t>Project</a:t>
+            </a:r>
+            <a:r>
+              <a:rPr lang="en-GB" baseline="0" dirty="0" smtClean="0"/>
+              <a:t> Started January 2009</a:t>
+            </a:r>
+          </a:p>
+          <a:p>
+            <a:r>
+              <a:rPr lang="en-GB" baseline="0" dirty="0" smtClean="0"/>
+              <a:t>FOSS</a:t>
+            </a:r>
+          </a:p>
+          <a:p>
+            <a:r>
+              <a:rPr lang="en-GB" baseline="0" dirty="0" smtClean="0"/>
+              <a:t>Note library runs on </a:t>
+            </a:r>
+            <a:r>
+              <a:rPr lang="en-GB" baseline="0" dirty="0" err="1" smtClean="0"/>
+              <a:t>.Net</a:t>
+            </a:r>
+            <a:r>
+              <a:rPr lang="en-GB" baseline="0" dirty="0" smtClean="0"/>
+              <a:t> and Mono natively</a:t>
+            </a:r>
+          </a:p>
+          <a:p>
+            <a:r>
+              <a:rPr lang="en-GB" baseline="0" dirty="0" smtClean="0"/>
+              <a:t>Silverlight/Windows Phone 7 community </a:t>
+            </a:r>
+            <a:r>
+              <a:rPr lang="en-GB" baseline="0" dirty="0" err="1" smtClean="0"/>
+              <a:t>contribs</a:t>
+            </a:r>
+            <a:r>
+              <a:rPr lang="en-GB" baseline="0" dirty="0" smtClean="0"/>
+              <a:t> so not as heavily tested – also cut down</a:t>
+            </a:r>
+            <a:endParaRPr lang="en-GB" dirty="0"/>
+          </a:p>
+        </p:txBody>
+      </p:sp>
+      <p:sp>
+        <p:nvSpPr>
+          <p:cNvPr id="4" name="Slide Number Placeholder 3"/>
+          <p:cNvSpPr>
+            <a:spLocks noGrp="1"/>
+          </p:cNvSpPr>
+          <p:nvPr>
+            <p:ph type="sldNum" sz="quarter" idx="10"/>
+          </p:nvPr>
+        </p:nvSpPr>
+        <p:spPr/>
+        <p:txBody>
+          <a:bodyPr/>
+          <a:lstStyle/>
+          <a:p>
+            <a:fld id="{62BAB909-6E45-45BB-A68B-B7C0D89A88D2}" type="slidenum">
+              <a:rPr lang="en-GB" smtClean="0"/>
+              <a:pPr/>
+              <a:t>3</a:t>
+            </a:fld>
+            <a:endParaRPr lang="en-GB"/>
+          </a:p>
+        </p:txBody>
+      </p:sp>
+    </p:spTree>
+  </p:cSld>
+  <p:clrMapOvr>
+    <a:masterClrMapping/>
+  </p:clrMapOvr>
+</p:notes>
+</file>
+
+<file path=ppt/notesSlides/notesSlide4.xml><?xml version="1.0" encoding="utf-8"?>
+<p:notes xmlns:a="http://schemas.openxmlformats.org/drawingml/2006/main" xmlns:r="http://schemas.openxmlformats.org/officeDocument/2006/relationships" xmlns:p="http://schemas.openxmlformats.org/presentationml/2006/main">
+  <p:cSld>
+    <p:spTree>
+      <p:nvGrpSpPr>
+        <p:cNvPr id="1" name=""/>
+        <p:cNvGrpSpPr/>
+        <p:nvPr/>
+      </p:nvGrpSpPr>
+      <p:grpSpPr>
+        <a:xfrm>
+          <a:off x="0" y="0"/>
+          <a:ext cx="0" cy="0"/>
+          <a:chOff x="0" y="0"/>
+          <a:chExt cx="0" cy="0"/>
+        </a:xfrm>
+      </p:grpSpPr>
+      <p:sp>
+        <p:nvSpPr>
+          <p:cNvPr id="2" name="Slide Image Placeholder 1"/>
+          <p:cNvSpPr>
+            <a:spLocks noGrp="1" noRot="1" noChangeAspect="1"/>
+          </p:cNvSpPr>
+          <p:nvPr>
+            <p:ph type="sldImg"/>
+          </p:nvPr>
+        </p:nvSpPr>
+        <p:spPr/>
+      </p:sp>
+      <p:sp>
+        <p:nvSpPr>
+          <p:cNvPr id="3" name="Notes Placeholder 2"/>
+          <p:cNvSpPr>
+            <a:spLocks noGrp="1"/>
+          </p:cNvSpPr>
+          <p:nvPr>
+            <p:ph type="body" idx="1"/>
+          </p:nvPr>
+        </p:nvSpPr>
+        <p:spPr/>
+        <p:txBody>
+          <a:bodyPr>
+            <a:normAutofit/>
+          </a:bodyPr>
+          <a:lstStyle/>
+          <a:p>
+            <a:r>
+              <a:rPr lang="en-GB" dirty="0" smtClean="0"/>
+              <a:t>Support standard RDF and common</a:t>
+            </a:r>
+            <a:r>
+              <a:rPr lang="en-GB" baseline="0" dirty="0" smtClean="0"/>
+              <a:t> extensions to RDF e.g. N3 Graph Literals and Variables</a:t>
+            </a:r>
+          </a:p>
+          <a:p>
+            <a:r>
+              <a:rPr lang="en-GB" baseline="0" dirty="0" smtClean="0"/>
+              <a:t>Supports named graphs and quads</a:t>
+            </a:r>
+          </a:p>
+          <a:p>
+            <a:r>
+              <a:rPr lang="en-GB" baseline="0" dirty="0" smtClean="0"/>
+              <a:t>Key design aim was to make it feel very </a:t>
+            </a:r>
+            <a:r>
+              <a:rPr lang="en-GB" baseline="0" dirty="0" err="1" smtClean="0"/>
+              <a:t>.Net</a:t>
+            </a:r>
+            <a:r>
+              <a:rPr lang="en-GB" baseline="0" dirty="0" smtClean="0"/>
+              <a:t> and make good use of available features</a:t>
+            </a:r>
+            <a:endParaRPr lang="en-GB" dirty="0"/>
+          </a:p>
+        </p:txBody>
+      </p:sp>
+      <p:sp>
+        <p:nvSpPr>
+          <p:cNvPr id="4" name="Slide Number Placeholder 3"/>
+          <p:cNvSpPr>
+            <a:spLocks noGrp="1"/>
+          </p:cNvSpPr>
+          <p:nvPr>
+            <p:ph type="sldNum" sz="quarter" idx="10"/>
+          </p:nvPr>
+        </p:nvSpPr>
+        <p:spPr/>
+        <p:txBody>
+          <a:bodyPr/>
+          <a:lstStyle/>
+          <a:p>
+            <a:fld id="{62BAB909-6E45-45BB-A68B-B7C0D89A88D2}" type="slidenum">
+              <a:rPr lang="en-GB" smtClean="0"/>
+              <a:pPr/>
+              <a:t>4</a:t>
+            </a:fld>
+            <a:endParaRPr lang="en-GB"/>
+          </a:p>
+        </p:txBody>
+      </p:sp>
+    </p:spTree>
+  </p:cSld>
+  <p:clrMapOvr>
+    <a:masterClrMapping/>
+  </p:clrMapOvr>
+</p:notes>
+</file>
+
+<file path=ppt/notesSlides/notesSlide5.xml><?xml version="1.0" encoding="utf-8"?>
+<p:notes xmlns:a="http://schemas.openxmlformats.org/drawingml/2006/main" xmlns:r="http://schemas.openxmlformats.org/officeDocument/2006/relationships" xmlns:p="http://schemas.openxmlformats.org/presentationml/2006/main">
+  <p:cSld>
+    <p:spTree>
+      <p:nvGrpSpPr>
+        <p:cNvPr id="1" name=""/>
+        <p:cNvGrpSpPr/>
+        <p:nvPr/>
+      </p:nvGrpSpPr>
+      <p:grpSpPr>
+        <a:xfrm>
+          <a:off x="0" y="0"/>
+          <a:ext cx="0" cy="0"/>
+          <a:chOff x="0" y="0"/>
+          <a:chExt cx="0" cy="0"/>
+        </a:xfrm>
+      </p:grpSpPr>
+      <p:sp>
+        <p:nvSpPr>
+          <p:cNvPr id="2" name="Slide Image Placeholder 1"/>
+          <p:cNvSpPr>
+            <a:spLocks noGrp="1" noRot="1" noChangeAspect="1"/>
+          </p:cNvSpPr>
+          <p:nvPr>
+            <p:ph type="sldImg"/>
+          </p:nvPr>
+        </p:nvSpPr>
+        <p:spPr/>
+      </p:sp>
+      <p:sp>
+        <p:nvSpPr>
+          <p:cNvPr id="3" name="Notes Placeholder 2"/>
+          <p:cNvSpPr>
+            <a:spLocks noGrp="1"/>
+          </p:cNvSpPr>
+          <p:nvPr>
+            <p:ph type="body" idx="1"/>
+          </p:nvPr>
+        </p:nvSpPr>
+        <p:spPr/>
+        <p:txBody>
+          <a:bodyPr>
+            <a:normAutofit/>
+          </a:bodyPr>
+          <a:lstStyle/>
+          <a:p>
+            <a:r>
+              <a:rPr lang="en-GB" dirty="0" smtClean="0"/>
+              <a:t>As you can see...</a:t>
+            </a:r>
+            <a:r>
+              <a:rPr lang="en-GB" baseline="0" dirty="0" smtClean="0"/>
+              <a:t> (run through the example quickly)</a:t>
+            </a:r>
+            <a:endParaRPr lang="en-GB" dirty="0"/>
+          </a:p>
+        </p:txBody>
+      </p:sp>
+      <p:sp>
+        <p:nvSpPr>
+          <p:cNvPr id="4" name="Slide Number Placeholder 3"/>
+          <p:cNvSpPr>
+            <a:spLocks noGrp="1"/>
+          </p:cNvSpPr>
+          <p:nvPr>
+            <p:ph type="sldNum" sz="quarter" idx="10"/>
+          </p:nvPr>
+        </p:nvSpPr>
+        <p:spPr/>
+        <p:txBody>
+          <a:bodyPr/>
+          <a:lstStyle/>
+          <a:p>
+            <a:fld id="{62BAB909-6E45-45BB-A68B-B7C0D89A88D2}" type="slidenum">
+              <a:rPr lang="en-GB" smtClean="0"/>
+              <a:pPr/>
+              <a:t>5</a:t>
+            </a:fld>
+            <a:endParaRPr lang="en-GB"/>
+          </a:p>
+        </p:txBody>
+      </p:sp>
+    </p:spTree>
+  </p:cSld>
+  <p:clrMapOvr>
+    <a:masterClrMapping/>
+  </p:clrMapOvr>
+</p:notes>
+</file>
+
+<file path=ppt/notesSlides/notesSlide6.xml><?xml version="1.0" encoding="utf-8"?>
+<p:notes xmlns:a="http://schemas.openxmlformats.org/drawingml/2006/main" xmlns:r="http://schemas.openxmlformats.org/officeDocument/2006/relationships" xmlns:p="http://schemas.openxmlformats.org/presentationml/2006/main">
+  <p:cSld>
+    <p:spTree>
+      <p:nvGrpSpPr>
+        <p:cNvPr id="1" name=""/>
+        <p:cNvGrpSpPr/>
+        <p:nvPr/>
+      </p:nvGrpSpPr>
+      <p:grpSpPr>
+        <a:xfrm>
+          <a:off x="0" y="0"/>
+          <a:ext cx="0" cy="0"/>
+          <a:chOff x="0" y="0"/>
+          <a:chExt cx="0" cy="0"/>
+        </a:xfrm>
+      </p:grpSpPr>
+      <p:sp>
+        <p:nvSpPr>
+          <p:cNvPr id="2" name="Slide Image Placeholder 1"/>
+          <p:cNvSpPr>
+            <a:spLocks noGrp="1" noRot="1" noChangeAspect="1"/>
+          </p:cNvSpPr>
+          <p:nvPr>
+            <p:ph type="sldImg"/>
+          </p:nvPr>
+        </p:nvSpPr>
+        <p:spPr/>
+      </p:sp>
+      <p:sp>
+        <p:nvSpPr>
+          <p:cNvPr id="3" name="Notes Placeholder 2"/>
+          <p:cNvSpPr>
+            <a:spLocks noGrp="1"/>
+          </p:cNvSpPr>
+          <p:nvPr>
+            <p:ph type="body" idx="1"/>
+          </p:nvPr>
+        </p:nvSpPr>
+        <p:spPr/>
+        <p:txBody>
+          <a:bodyPr>
+            <a:normAutofit/>
+          </a:bodyPr>
+          <a:lstStyle/>
+          <a:p>
+            <a:r>
+              <a:rPr lang="en-GB" dirty="0" smtClean="0"/>
+              <a:t>Introduce Leviathan</a:t>
+            </a:r>
+          </a:p>
+          <a:p>
+            <a:r>
+              <a:rPr lang="en-GB" dirty="0" smtClean="0"/>
+              <a:t>Mention scalability</a:t>
+            </a:r>
+            <a:r>
+              <a:rPr lang="en-GB" baseline="0" dirty="0" smtClean="0"/>
+              <a:t> in-memory</a:t>
+            </a:r>
+          </a:p>
+          <a:p>
+            <a:r>
+              <a:rPr lang="en-GB" baseline="0" dirty="0" smtClean="0"/>
+              <a:t>Can be applied to out of memory datasets but currently slower than in-memory (will be modified to address this in future releases)</a:t>
+            </a:r>
+          </a:p>
+          <a:p>
+            <a:r>
+              <a:rPr lang="en-GB" baseline="0" dirty="0" smtClean="0"/>
+              <a:t>Note support for Update</a:t>
+            </a:r>
+          </a:p>
+          <a:p>
+            <a:r>
+              <a:rPr lang="en-GB" baseline="0" dirty="0" smtClean="0"/>
+              <a:t>Note support for Federated Query Extensions</a:t>
+            </a:r>
+          </a:p>
+          <a:p>
+            <a:r>
+              <a:rPr lang="en-GB" baseline="0" dirty="0" smtClean="0"/>
+              <a:t>Note support for Transactions for Update</a:t>
+            </a:r>
+            <a:endParaRPr lang="en-GB" dirty="0"/>
+          </a:p>
+        </p:txBody>
+      </p:sp>
+      <p:sp>
+        <p:nvSpPr>
+          <p:cNvPr id="4" name="Slide Number Placeholder 3"/>
+          <p:cNvSpPr>
+            <a:spLocks noGrp="1"/>
+          </p:cNvSpPr>
+          <p:nvPr>
+            <p:ph type="sldNum" sz="quarter" idx="10"/>
+          </p:nvPr>
+        </p:nvSpPr>
+        <p:spPr/>
+        <p:txBody>
+          <a:bodyPr/>
+          <a:lstStyle/>
+          <a:p>
+            <a:fld id="{62BAB909-6E45-45BB-A68B-B7C0D89A88D2}" type="slidenum">
+              <a:rPr lang="en-GB" smtClean="0"/>
+              <a:pPr/>
+              <a:t>6</a:t>
+            </a:fld>
+            <a:endParaRPr lang="en-GB"/>
+          </a:p>
+        </p:txBody>
+      </p:sp>
+    </p:spTree>
+  </p:cSld>
+  <p:clrMapOvr>
+    <a:masterClrMapping/>
+  </p:clrMapOvr>
+</p:notes>
+</file>
+
+<file path=ppt/notesSlides/notesSlide7.xml><?xml version="1.0" encoding="utf-8"?>
+<p:notes xmlns:a="http://schemas.openxmlformats.org/drawingml/2006/main" xmlns:r="http://schemas.openxmlformats.org/officeDocument/2006/relationships" xmlns:p="http://schemas.openxmlformats.org/presentationml/2006/main">
+  <p:cSld>
+    <p:spTree>
+      <p:nvGrpSpPr>
+        <p:cNvPr id="1" name=""/>
+        <p:cNvGrpSpPr/>
+        <p:nvPr/>
+      </p:nvGrpSpPr>
+      <p:grpSpPr>
+        <a:xfrm>
+          <a:off x="0" y="0"/>
+          <a:ext cx="0" cy="0"/>
+          <a:chOff x="0" y="0"/>
+          <a:chExt cx="0" cy="0"/>
+        </a:xfrm>
+      </p:grpSpPr>
+      <p:sp>
+        <p:nvSpPr>
+          <p:cNvPr id="2" name="Slide Image Placeholder 1"/>
+          <p:cNvSpPr>
+            <a:spLocks noGrp="1" noRot="1" noChangeAspect="1"/>
+          </p:cNvSpPr>
+          <p:nvPr>
+            <p:ph type="sldImg"/>
+          </p:nvPr>
+        </p:nvSpPr>
+        <p:spPr/>
+      </p:sp>
+      <p:sp>
+        <p:nvSpPr>
+          <p:cNvPr id="3" name="Notes Placeholder 2"/>
+          <p:cNvSpPr>
+            <a:spLocks noGrp="1"/>
+          </p:cNvSpPr>
+          <p:nvPr>
+            <p:ph type="body" idx="1"/>
+          </p:nvPr>
+        </p:nvSpPr>
+        <p:spPr/>
+        <p:txBody>
+          <a:bodyPr>
+            <a:normAutofit/>
+          </a:bodyPr>
+          <a:lstStyle/>
+          <a:p>
+            <a:r>
+              <a:rPr lang="en-GB" dirty="0" smtClean="0"/>
+              <a:t>One of our</a:t>
+            </a:r>
+            <a:r>
+              <a:rPr lang="en-GB" baseline="0" dirty="0" smtClean="0"/>
+              <a:t> key aims was always to make it easy to move your data in and out of different Triple stores</a:t>
+            </a:r>
+          </a:p>
+          <a:p>
+            <a:r>
+              <a:rPr lang="en-GB" baseline="0" dirty="0" smtClean="0"/>
+              <a:t>We are working on adding more e.g. </a:t>
+            </a:r>
+            <a:r>
+              <a:rPr lang="en-GB" baseline="0" dirty="0" err="1" smtClean="0"/>
+              <a:t>Dydra</a:t>
+            </a:r>
+            <a:endParaRPr lang="en-GB" dirty="0"/>
+          </a:p>
+        </p:txBody>
+      </p:sp>
+      <p:sp>
+        <p:nvSpPr>
+          <p:cNvPr id="4" name="Slide Number Placeholder 3"/>
+          <p:cNvSpPr>
+            <a:spLocks noGrp="1"/>
+          </p:cNvSpPr>
+          <p:nvPr>
+            <p:ph type="sldNum" sz="quarter" idx="10"/>
+          </p:nvPr>
+        </p:nvSpPr>
+        <p:spPr/>
+        <p:txBody>
+          <a:bodyPr/>
+          <a:lstStyle/>
+          <a:p>
+            <a:fld id="{62BAB909-6E45-45BB-A68B-B7C0D89A88D2}" type="slidenum">
+              <a:rPr lang="en-GB" smtClean="0"/>
+              <a:pPr/>
+              <a:t>7</a:t>
+            </a:fld>
+            <a:endParaRPr lang="en-GB"/>
+          </a:p>
+        </p:txBody>
+      </p:sp>
+    </p:spTree>
+  </p:cSld>
+  <p:clrMapOvr>
+    <a:masterClrMapping/>
+  </p:clrMapOvr>
+</p:notes>
+</file>
+
+<file path=ppt/notesSlides/notesSlide8.xml><?xml version="1.0" encoding="utf-8"?>
+<p:notes xmlns:a="http://schemas.openxmlformats.org/drawingml/2006/main" xmlns:r="http://schemas.openxmlformats.org/officeDocument/2006/relationships" xmlns:p="http://schemas.openxmlformats.org/presentationml/2006/main">
+  <p:cSld>
+    <p:spTree>
+      <p:nvGrpSpPr>
+        <p:cNvPr id="1" name=""/>
+        <p:cNvGrpSpPr/>
+        <p:nvPr/>
+      </p:nvGrpSpPr>
+      <p:grpSpPr>
+        <a:xfrm>
+          <a:off x="0" y="0"/>
+          <a:ext cx="0" cy="0"/>
+          <a:chOff x="0" y="0"/>
+          <a:chExt cx="0" cy="0"/>
+        </a:xfrm>
+      </p:grpSpPr>
+      <p:sp>
+        <p:nvSpPr>
+          <p:cNvPr id="2" name="Slide Image Placeholder 1"/>
+          <p:cNvSpPr>
+            <a:spLocks noGrp="1" noRot="1" noChangeAspect="1"/>
+          </p:cNvSpPr>
+          <p:nvPr>
+            <p:ph type="sldImg"/>
+          </p:nvPr>
+        </p:nvSpPr>
+        <p:spPr/>
+      </p:sp>
+      <p:sp>
+        <p:nvSpPr>
+          <p:cNvPr id="3" name="Notes Placeholder 2"/>
+          <p:cNvSpPr>
+            <a:spLocks noGrp="1"/>
+          </p:cNvSpPr>
+          <p:nvPr>
+            <p:ph type="body" idx="1"/>
+          </p:nvPr>
+        </p:nvSpPr>
+        <p:spPr/>
+        <p:txBody>
+          <a:bodyPr>
+            <a:normAutofit/>
+          </a:bodyPr>
+          <a:lstStyle/>
+          <a:p>
+            <a:r>
+              <a:rPr lang="en-GB" dirty="0" smtClean="0"/>
+              <a:t>We don’t just provide a library</a:t>
+            </a:r>
+          </a:p>
+          <a:p>
+            <a:r>
+              <a:rPr lang="en-GB" dirty="0" smtClean="0"/>
+              <a:t>Our</a:t>
+            </a:r>
+            <a:r>
+              <a:rPr lang="en-GB" baseline="0" dirty="0" smtClean="0"/>
+              <a:t> toolkit provides a variety of tools which are useful for day to day non-coding work with RDF e.g. </a:t>
+            </a:r>
+            <a:r>
+              <a:rPr lang="en-GB" baseline="0" dirty="0" err="1" smtClean="0"/>
+              <a:t>rdfEditor</a:t>
+            </a:r>
+            <a:endParaRPr lang="en-GB" baseline="0" dirty="0" smtClean="0"/>
+          </a:p>
+          <a:p>
+            <a:r>
+              <a:rPr lang="en-GB" baseline="0" dirty="0" smtClean="0"/>
+              <a:t>We eat our own </a:t>
+            </a:r>
+            <a:r>
+              <a:rPr lang="en-GB" baseline="0" dirty="0" err="1" smtClean="0"/>
+              <a:t>dogfood</a:t>
+            </a:r>
+            <a:r>
+              <a:rPr lang="en-GB" baseline="0" dirty="0" smtClean="0"/>
+              <a:t> – any RDF we add to our codebase is almost certainly created and validated using </a:t>
+            </a:r>
+            <a:r>
+              <a:rPr lang="en-GB" baseline="0" dirty="0" err="1" smtClean="0"/>
+              <a:t>rdfEditor</a:t>
+            </a:r>
+            <a:endParaRPr lang="en-GB" baseline="0" dirty="0" smtClean="0"/>
+          </a:p>
+        </p:txBody>
+      </p:sp>
+      <p:sp>
+        <p:nvSpPr>
+          <p:cNvPr id="4" name="Slide Number Placeholder 3"/>
+          <p:cNvSpPr>
+            <a:spLocks noGrp="1"/>
+          </p:cNvSpPr>
+          <p:nvPr>
+            <p:ph type="sldNum" sz="quarter" idx="10"/>
+          </p:nvPr>
+        </p:nvSpPr>
+        <p:spPr/>
+        <p:txBody>
+          <a:bodyPr/>
+          <a:lstStyle/>
+          <a:p>
+            <a:fld id="{62BAB909-6E45-45BB-A68B-B7C0D89A88D2}" type="slidenum">
+              <a:rPr lang="en-GB" smtClean="0"/>
+              <a:pPr/>
+              <a:t>8</a:t>
+            </a:fld>
+            <a:endParaRPr lang="en-GB"/>
+          </a:p>
+        </p:txBody>
+      </p:sp>
+    </p:spTree>
+  </p:cSld>
+  <p:clrMapOvr>
+    <a:masterClrMapping/>
+  </p:clrMapOvr>
+</p:notes>
+</file>
+
+<file path=ppt/notesSlides/notesSlide9.xml><?xml version="1.0" encoding="utf-8"?>
+<p:notes xmlns:a="http://schemas.openxmlformats.org/drawingml/2006/main" xmlns:r="http://schemas.openxmlformats.org/officeDocument/2006/relationships" xmlns:p="http://schemas.openxmlformats.org/presentationml/2006/main">
+  <p:cSld>
+    <p:spTree>
+      <p:nvGrpSpPr>
+        <p:cNvPr id="1" name=""/>
+        <p:cNvGrpSpPr/>
+        <p:nvPr/>
+      </p:nvGrpSpPr>
+      <p:grpSpPr>
+        <a:xfrm>
+          <a:off x="0" y="0"/>
+          <a:ext cx="0" cy="0"/>
+          <a:chOff x="0" y="0"/>
+          <a:chExt cx="0" cy="0"/>
+        </a:xfrm>
+      </p:grpSpPr>
+      <p:sp>
+        <p:nvSpPr>
+          <p:cNvPr id="2" name="Slide Image Placeholder 1"/>
+          <p:cNvSpPr>
+            <a:spLocks noGrp="1" noRot="1" noChangeAspect="1"/>
+          </p:cNvSpPr>
+          <p:nvPr>
+            <p:ph type="sldImg"/>
+          </p:nvPr>
+        </p:nvSpPr>
+        <p:spPr/>
+      </p:sp>
+      <p:sp>
+        <p:nvSpPr>
+          <p:cNvPr id="3" name="Notes Placeholder 2"/>
+          <p:cNvSpPr>
+            <a:spLocks noGrp="1"/>
+          </p:cNvSpPr>
+          <p:nvPr>
+            <p:ph type="body" idx="1"/>
+          </p:nvPr>
+        </p:nvSpPr>
+        <p:spPr/>
+        <p:txBody>
+          <a:bodyPr/>
+          <a:lstStyle/>
+          <a:p>
+            <a:r>
+              <a:rPr lang="en-GB" dirty="0" smtClean="0"/>
+              <a:t>This is a quick overview of a few of the things we’re currently working on</a:t>
+            </a:r>
+          </a:p>
+          <a:p>
+            <a:r>
+              <a:rPr lang="en-GB" dirty="0" smtClean="0"/>
+              <a:t>Most new features are driven either by user</a:t>
+            </a:r>
+            <a:r>
+              <a:rPr lang="en-GB" baseline="0" dirty="0" smtClean="0"/>
+              <a:t> request e.g. Optimiser API in latest release</a:t>
+            </a:r>
+            <a:endParaRPr lang="en-GB" dirty="0"/>
+          </a:p>
+        </p:txBody>
+      </p:sp>
+      <p:sp>
+        <p:nvSpPr>
+          <p:cNvPr id="4" name="Slide Number Placeholder 3"/>
+          <p:cNvSpPr>
+            <a:spLocks noGrp="1"/>
+          </p:cNvSpPr>
+          <p:nvPr>
+            <p:ph type="sldNum" sz="quarter" idx="10"/>
+          </p:nvPr>
+        </p:nvSpPr>
+        <p:spPr/>
+        <p:txBody>
+          <a:bodyPr/>
+          <a:lstStyle/>
+          <a:p>
+            <a:fld id="{62BAB909-6E45-45BB-A68B-B7C0D89A88D2}" type="slidenum">
+              <a:rPr lang="en-GB" smtClean="0"/>
+              <a:pPr/>
               <a:t>9</a:t>
             </a:fld>
             <a:endParaRPr lang="en-GB"/>
@@ -543,7 +1538,7 @@
     </p:spTree>
     <p:extLst>
       <p:ext uri="{BB962C8B-B14F-4D97-AF65-F5344CB8AC3E}">
-        <p14:creationId xmlns:p14="http://schemas.microsoft.com/office/powerpoint/2010/main" val="1822399441"/>
+        <p14:creationId xmlns:p14="http://schemas.microsoft.com/office/powerpoint/2010/main" xmlns="" val="1822399441"/>
       </p:ext>
     </p:extLst>
   </p:cSld>
@@ -3373,7 +4368,7 @@
           <p:nvPr/>
         </p:nvPicPr>
         <p:blipFill>
-          <a:blip r:embed="rId2" cstate="print"/>
+          <a:blip r:embed="rId3" cstate="print"/>
           <a:stretch>
             <a:fillRect/>
           </a:stretch>
@@ -3397,7 +4392,7 @@
           <p:nvPr/>
         </p:nvPicPr>
         <p:blipFill>
-          <a:blip r:embed="rId3" cstate="print"/>
+          <a:blip r:embed="rId4" cstate="print"/>
           <a:stretch>
             <a:fillRect/>
           </a:stretch>
@@ -3495,7 +4490,7 @@
             </a:r>
             <a:r>
               <a:rPr lang="en-GB" dirty="0" smtClean="0">
-                <a:hlinkClick r:id="rId2"/>
+                <a:hlinkClick r:id="rId3"/>
               </a:rPr>
               <a:t>rvesse@dotnetrdf.org</a:t>
             </a:r>
@@ -3519,26 +4514,20 @@
             </a:r>
             <a:r>
               <a:rPr lang="en-GB" dirty="0" smtClean="0">
-                <a:hlinkClick r:id="rId3"/>
+                <a:hlinkClick r:id="rId4"/>
               </a:rPr>
-              <a:t>http://</a:t>
+              <a:t>http://www.dotnetrdf.org</a:t>
+            </a:r>
+            <a:endParaRPr lang="en-GB" dirty="0" smtClean="0"/>
+          </a:p>
+          <a:p>
+            <a:r>
+              <a:rPr lang="en-GB" dirty="0" smtClean="0"/>
+              <a:t>Via Mailing List: </a:t>
             </a:r>
             <a:r>
               <a:rPr lang="en-GB" dirty="0" smtClean="0">
-                <a:hlinkClick r:id="rId3"/>
-              </a:rPr>
-              <a:t>www.dotnetrdf.org</a:t>
-            </a:r>
-            <a:endParaRPr lang="en-GB" dirty="0" smtClean="0"/>
-          </a:p>
-          <a:p>
-            <a:r>
-              <a:rPr lang="en-GB" dirty="0" smtClean="0"/>
-              <a:t>Via Mailing List: </a:t>
-            </a:r>
-            <a:r>
-              <a:rPr lang="en-GB" dirty="0" smtClean="0">
-                <a:hlinkClick r:id="rId4"/>
+                <a:hlinkClick r:id="rId5"/>
               </a:rPr>
               <a:t>dotnetrdf-support@lists.sf.net</a:t>
             </a:r>
@@ -3622,7 +4611,7 @@
     </p:spTree>
     <p:extLst>
       <p:ext uri="{BB962C8B-B14F-4D97-AF65-F5344CB8AC3E}">
-        <p14:creationId xmlns:p14="http://schemas.microsoft.com/office/powerpoint/2010/main" val="1033892453"/>
+        <p14:creationId xmlns:p14="http://schemas.microsoft.com/office/powerpoint/2010/main" xmlns="" val="1033892453"/>
       </p:ext>
     </p:extLst>
   </p:cSld>
@@ -3696,11 +4685,7 @@
           <a:p>
             <a:r>
               <a:rPr lang="en-GB" dirty="0" smtClean="0"/>
-              <a:t>Wanted to be able to code PhD Research projects using </a:t>
-            </a:r>
-            <a:r>
-              <a:rPr lang="en-GB" dirty="0" smtClean="0"/>
-              <a:t>a </a:t>
+              <a:t>Wanted to be able to code PhD Research projects using a </a:t>
             </a:r>
             <a:r>
               <a:rPr lang="en-GB" dirty="0" err="1" smtClean="0"/>
@@ -3710,7 +4695,6 @@
               <a:rPr lang="en-GB" dirty="0" smtClean="0"/>
               <a:t> technology stack</a:t>
             </a:r>
-            <a:endParaRPr lang="en-GB" dirty="0" smtClean="0"/>
           </a:p>
           <a:p>
             <a:r>
@@ -3839,7 +4823,7 @@
     </p:spTree>
     <p:extLst>
       <p:ext uri="{BB962C8B-B14F-4D97-AF65-F5344CB8AC3E}">
-        <p14:creationId xmlns:p14="http://schemas.microsoft.com/office/powerpoint/2010/main" val="1433084001"/>
+        <p14:creationId xmlns:p14="http://schemas.microsoft.com/office/powerpoint/2010/main" xmlns="" val="1433084001"/>
       </p:ext>
     </p:extLst>
   </p:cSld>
@@ -3956,11 +4940,7 @@
             </a:r>
             <a:r>
               <a:rPr lang="en-GB" dirty="0" smtClean="0"/>
-              <a:t>and Windows Phone 7 (latter two are cut </a:t>
-            </a:r>
-            <a:r>
-              <a:rPr lang="en-GB" dirty="0" smtClean="0"/>
-              <a:t>down and community contributed)</a:t>
+              <a:t>and Windows Phone 7 (latter two are cut down and community contributed)</a:t>
             </a:r>
             <a:endParaRPr lang="en-GB" dirty="0"/>
           </a:p>
@@ -4039,7 +5019,7 @@
     </p:spTree>
     <p:extLst>
       <p:ext uri="{BB962C8B-B14F-4D97-AF65-F5344CB8AC3E}">
-        <p14:creationId xmlns:p14="http://schemas.microsoft.com/office/powerpoint/2010/main" val="1261952963"/>
+        <p14:creationId xmlns:p14="http://schemas.microsoft.com/office/powerpoint/2010/main" xmlns="" val="1261952963"/>
       </p:ext>
     </p:extLst>
   </p:cSld>
@@ -4156,15 +5136,7 @@
             <a:pPr lvl="1"/>
             <a:r>
               <a:rPr lang="en-GB" dirty="0" smtClean="0"/>
-              <a:t>LINQ to Objects, Properties, </a:t>
-            </a:r>
-            <a:r>
-              <a:rPr lang="en-GB" dirty="0" smtClean="0"/>
-              <a:t>Indexers, Extension Methods </a:t>
-            </a:r>
-            <a:r>
-              <a:rPr lang="en-GB" dirty="0" smtClean="0"/>
-              <a:t>etc.</a:t>
+              <a:t>LINQ to Objects, Properties, Indexers, Extension Methods etc.</a:t>
             </a:r>
             <a:endParaRPr lang="en-GB" dirty="0"/>
           </a:p>
@@ -4243,7 +5215,7 @@
     </p:spTree>
     <p:extLst>
       <p:ext uri="{BB962C8B-B14F-4D97-AF65-F5344CB8AC3E}">
-        <p14:creationId xmlns:p14="http://schemas.microsoft.com/office/powerpoint/2010/main" val="1242817697"/>
+        <p14:creationId xmlns:p14="http://schemas.microsoft.com/office/powerpoint/2010/main" xmlns="" val="1242817697"/>
       </p:ext>
     </p:extLst>
   </p:cSld>
@@ -4910,7 +5882,7 @@
     </p:spTree>
     <p:extLst>
       <p:ext uri="{BB962C8B-B14F-4D97-AF65-F5344CB8AC3E}">
-        <p14:creationId xmlns:p14="http://schemas.microsoft.com/office/powerpoint/2010/main" val="4028848223"/>
+        <p14:creationId xmlns:p14="http://schemas.microsoft.com/office/powerpoint/2010/main" xmlns="" val="4028848223"/>
       </p:ext>
     </p:extLst>
   </p:cSld>
@@ -4988,7 +5960,6 @@
               <a:rPr lang="en-GB" dirty="0" smtClean="0"/>
               <a:t>Capable of performing SPARQL queries in-memory on small amounts of data (&lt;=1m Triples)</a:t>
             </a:r>
-            <a:endParaRPr lang="en-GB" dirty="0" smtClean="0"/>
           </a:p>
           <a:p>
             <a:r>
@@ -4997,11 +5968,7 @@
             </a:r>
             <a:r>
               <a:rPr lang="en-GB" dirty="0" smtClean="0"/>
-              <a:t>upports </a:t>
-            </a:r>
-            <a:r>
-              <a:rPr lang="en-GB" dirty="0" smtClean="0"/>
-              <a:t>both Query and Update including powerful features like:</a:t>
+              <a:t>upports both Query and Update including powerful features like:</a:t>
             </a:r>
           </a:p>
           <a:p>
@@ -5101,7 +6068,7 @@
     </p:spTree>
     <p:extLst>
       <p:ext uri="{BB962C8B-B14F-4D97-AF65-F5344CB8AC3E}">
-        <p14:creationId xmlns:p14="http://schemas.microsoft.com/office/powerpoint/2010/main" val="3635472907"/>
+        <p14:creationId xmlns:p14="http://schemas.microsoft.com/office/powerpoint/2010/main" xmlns="" val="3635472907"/>
       </p:ext>
     </p:extLst>
   </p:cSld>
@@ -5185,19 +6152,7 @@
           <a:p>
             <a:r>
               <a:rPr lang="en-GB" dirty="0" smtClean="0"/>
-              <a:t>Supports a range of </a:t>
-            </a:r>
-            <a:r>
-              <a:rPr lang="en-GB" dirty="0" smtClean="0"/>
-              <a:t>well known</a:t>
-            </a:r>
-            <a:r>
-              <a:rPr lang="en-GB" dirty="0" smtClean="0"/>
-              <a:t> </a:t>
-            </a:r>
-            <a:r>
-              <a:rPr lang="en-GB" dirty="0" smtClean="0"/>
-              <a:t>3</a:t>
+              <a:t>Supports a range of well known 3</a:t>
             </a:r>
             <a:r>
               <a:rPr lang="en-GB" baseline="30000" dirty="0" smtClean="0"/>
@@ -5248,11 +6203,7 @@
             </a:r>
             <a:r>
               <a:rPr lang="en-GB" dirty="0" smtClean="0"/>
-              <a:t> and </a:t>
-            </a:r>
-            <a:r>
-              <a:rPr lang="en-GB" dirty="0" smtClean="0"/>
-              <a:t>Virtuoso</a:t>
+              <a:t> and Virtuoso</a:t>
             </a:r>
           </a:p>
           <a:p>
@@ -5261,7 +6212,6 @@
               <a:rPr lang="en-GB" dirty="0" smtClean="0"/>
               <a:t>Plus generic SPARQL store support</a:t>
             </a:r>
-            <a:endParaRPr lang="en-GB" dirty="0" smtClean="0"/>
           </a:p>
           <a:p>
             <a:r>
@@ -5345,7 +6295,7 @@
     </p:spTree>
     <p:extLst>
       <p:ext uri="{BB962C8B-B14F-4D97-AF65-F5344CB8AC3E}">
-        <p14:creationId xmlns:p14="http://schemas.microsoft.com/office/powerpoint/2010/main" val="3134440440"/>
+        <p14:creationId xmlns:p14="http://schemas.microsoft.com/office/powerpoint/2010/main" xmlns="" val="3134440440"/>
       </p:ext>
     </p:extLst>
   </p:cSld>
@@ -5449,19 +6399,7 @@
           <a:p>
             <a:r>
               <a:rPr lang="en-GB" dirty="0" smtClean="0"/>
-              <a:t>Designed to make it possible to get you started experimenting with RDF and </a:t>
-            </a:r>
-            <a:r>
-              <a:rPr lang="en-GB" dirty="0" smtClean="0"/>
-              <a:t>SPARQL on Windows </a:t>
-            </a:r>
-            <a:r>
-              <a:rPr lang="en-GB" dirty="0" smtClean="0"/>
-              <a:t>without having to </a:t>
-            </a:r>
-            <a:r>
-              <a:rPr lang="en-GB" dirty="0" smtClean="0"/>
-              <a:t>code yourself</a:t>
+              <a:t>Designed to make it possible to get you started experimenting with RDF and SPARQL on Windows without having to code yourself</a:t>
             </a:r>
             <a:endParaRPr lang="en-GB" dirty="0"/>
           </a:p>
@@ -5540,7 +6478,7 @@
     </p:spTree>
     <p:extLst>
       <p:ext uri="{BB962C8B-B14F-4D97-AF65-F5344CB8AC3E}">
-        <p14:creationId xmlns:p14="http://schemas.microsoft.com/office/powerpoint/2010/main" val="1013986863"/>
+        <p14:creationId xmlns:p14="http://schemas.microsoft.com/office/powerpoint/2010/main" xmlns="" val="1013986863"/>
       </p:ext>
     </p:extLst>
   </p:cSld>
@@ -5591,11 +6529,7 @@
           <a:p>
             <a:r>
               <a:rPr lang="en-GB" dirty="0" smtClean="0"/>
-              <a:t>Coming </a:t>
-            </a:r>
-            <a:r>
-              <a:rPr lang="en-GB" dirty="0" smtClean="0"/>
-              <a:t>Soon</a:t>
+              <a:t>Coming Soon</a:t>
             </a:r>
             <a:endParaRPr lang="en-GB" dirty="0"/>
           </a:p>
@@ -5700,11 +6634,7 @@
           <a:p>
             <a:r>
               <a:rPr lang="en-GB" dirty="0" smtClean="0"/>
-              <a:t>OWL </a:t>
-            </a:r>
-            <a:r>
-              <a:rPr lang="en-GB" dirty="0" smtClean="0"/>
-              <a:t>Support</a:t>
+              <a:t>OWL Support</a:t>
             </a:r>
           </a:p>
           <a:p>
@@ -5803,7 +6733,7 @@
     </p:spTree>
     <p:extLst>
       <p:ext uri="{BB962C8B-B14F-4D97-AF65-F5344CB8AC3E}">
-        <p14:creationId xmlns:p14="http://schemas.microsoft.com/office/powerpoint/2010/main" val="4051079796"/>
+        <p14:creationId xmlns:p14="http://schemas.microsoft.com/office/powerpoint/2010/main" xmlns="" val="4051079796"/>
       </p:ext>
     </p:extLst>
   </p:cSld>

</xml_diff>